<commit_message>
Updated for Matt's first teach
</commit_message>
<xml_diff>
--- a/Slides/DevelopingWithTheSmartPlayerAPI_May13_mboles.pptx
+++ b/Slides/DevelopingWithTheSmartPlayerAPI_May13_mboles.pptx
@@ -1061,11 +1061,7 @@
         <a:p>
           <a:r>
             <a:rPr lang="en-US" dirty="0" smtClean="0"/>
-            <a:t>Accessing </a:t>
-          </a:r>
-          <a:r>
-            <a:rPr lang="en-US" dirty="0" smtClean="0"/>
-            <a:t>Video Data</a:t>
+            <a:t>Accessing Video Data</a:t>
           </a:r>
           <a:endParaRPr lang="en-US" dirty="0"/>
         </a:p>
@@ -1169,7 +1165,6 @@
             <a:rPr lang="en-US" dirty="0" smtClean="0"/>
             <a:t>Checking Renditions</a:t>
           </a:r>
-          <a:endParaRPr lang="en-US" dirty="0" smtClean="0"/>
         </a:p>
       </dgm:t>
     </dgm:pt>
@@ -1220,7 +1215,6 @@
             <a:rPr lang="en-US" dirty="0" smtClean="0"/>
             <a:t>Fetching and Displaying Playlists</a:t>
           </a:r>
-          <a:endParaRPr lang="en-US" dirty="0" smtClean="0"/>
         </a:p>
       </dgm:t>
     </dgm:pt>
@@ -1879,11 +1873,7 @@
           </a:pPr>
           <a:r>
             <a:rPr lang="en-US" sz="3100" kern="1200" dirty="0" smtClean="0"/>
-            <a:t>Accessing </a:t>
-          </a:r>
-          <a:r>
-            <a:rPr lang="en-US" sz="3100" kern="1200" dirty="0" smtClean="0"/>
-            <a:t>Video Data</a:t>
+            <a:t>Accessing Video Data</a:t>
           </a:r>
           <a:endParaRPr lang="en-US" sz="3100" kern="1200" dirty="0"/>
         </a:p>
@@ -2266,7 +2256,6 @@
             <a:rPr lang="en-US" sz="3100" kern="1200" dirty="0" smtClean="0"/>
             <a:t>Checking Renditions</a:t>
           </a:r>
-          <a:endParaRPr lang="en-US" sz="3100" kern="1200" dirty="0" smtClean="0"/>
         </a:p>
       </dsp:txBody>
       <dsp:txXfrm rot="10800000">
@@ -2393,7 +2382,6 @@
             <a:rPr lang="en-US" sz="3100" kern="1200" dirty="0" smtClean="0"/>
             <a:t>Fetching and Displaying Playlists</a:t>
           </a:r>
-          <a:endParaRPr lang="en-US" sz="3100" kern="1200" dirty="0" smtClean="0"/>
         </a:p>
       </dsp:txBody>
       <dsp:txXfrm rot="10800000">
@@ -3731,7 +3719,7 @@
             <a:fld id="{DDC063FE-8627-9A42-970F-0BBEEB02B587}" type="datetimeFigureOut">
               <a:rPr lang="en-US" smtClean="0"/>
               <a:pPr/>
-              <a:t>5/5/13</a:t>
+              <a:t>5/6/13</a:t>
             </a:fld>
             <a:endParaRPr lang="en-US" dirty="0"/>
           </a:p>
@@ -8474,23 +8462,7 @@
                   <a:srgbClr val="FBFCFF"/>
                 </a:solidFill>
               </a:rPr>
-              <a:t>© </a:t>
-            </a:r>
-            <a:r>
-              <a:rPr lang="en-US" sz="1400" dirty="0" smtClean="0">
-                <a:solidFill>
-                  <a:srgbClr val="FBFCFF"/>
-                </a:solidFill>
-              </a:rPr>
-              <a:t>2013 </a:t>
-            </a:r>
-            <a:r>
-              <a:rPr lang="en-US" sz="1400" dirty="0" smtClean="0">
-                <a:solidFill>
-                  <a:srgbClr val="FBFCFF"/>
-                </a:solidFill>
-              </a:rPr>
-              <a:t>Brightcove Inc.</a:t>
+              <a:t>© 2013 Brightcove Inc.</a:t>
             </a:r>
           </a:p>
         </p:txBody>
@@ -8821,23 +8793,7 @@
                   <a:srgbClr val="FBFCFF"/>
                 </a:solidFill>
               </a:rPr>
-              <a:t>© </a:t>
-            </a:r>
-            <a:r>
-              <a:rPr lang="en-US" sz="1400" dirty="0" smtClean="0">
-                <a:solidFill>
-                  <a:srgbClr val="FBFCFF"/>
-                </a:solidFill>
-              </a:rPr>
-              <a:t>2013 </a:t>
-            </a:r>
-            <a:r>
-              <a:rPr lang="en-US" sz="1400" dirty="0" smtClean="0">
-                <a:solidFill>
-                  <a:srgbClr val="FBFCFF"/>
-                </a:solidFill>
-              </a:rPr>
-              <a:t>Brightcove Inc.</a:t>
+              <a:t>© 2013 Brightcove Inc.</a:t>
             </a:r>
           </a:p>
         </p:txBody>
@@ -9229,23 +9185,7 @@
                   <a:srgbClr val="FBFCFF"/>
                 </a:solidFill>
               </a:rPr>
-              <a:t>© </a:t>
-            </a:r>
-            <a:r>
-              <a:rPr lang="en-US" sz="1400" dirty="0" smtClean="0">
-                <a:solidFill>
-                  <a:srgbClr val="FBFCFF"/>
-                </a:solidFill>
-              </a:rPr>
-              <a:t>2013 </a:t>
-            </a:r>
-            <a:r>
-              <a:rPr lang="en-US" sz="1400" dirty="0" smtClean="0">
-                <a:solidFill>
-                  <a:srgbClr val="FBFCFF"/>
-                </a:solidFill>
-              </a:rPr>
-              <a:t>Brightcove Inc.</a:t>
+              <a:t>© 2013 Brightcove Inc.</a:t>
             </a:r>
           </a:p>
         </p:txBody>
@@ -9519,23 +9459,7 @@
                   <a:srgbClr val="FBFCFF"/>
                 </a:solidFill>
               </a:rPr>
-              <a:t>© </a:t>
-            </a:r>
-            <a:r>
-              <a:rPr lang="en-US" sz="1400" dirty="0" smtClean="0">
-                <a:solidFill>
-                  <a:srgbClr val="FBFCFF"/>
-                </a:solidFill>
-              </a:rPr>
-              <a:t>2013 </a:t>
-            </a:r>
-            <a:r>
-              <a:rPr lang="en-US" sz="1400" dirty="0" smtClean="0">
-                <a:solidFill>
-                  <a:srgbClr val="FBFCFF"/>
-                </a:solidFill>
-              </a:rPr>
-              <a:t>Brightcove Inc.</a:t>
+              <a:t>© 2013 Brightcove Inc.</a:t>
             </a:r>
           </a:p>
         </p:txBody>
@@ -9896,23 +9820,7 @@
                   <a:srgbClr val="FBFCFF"/>
                 </a:solidFill>
               </a:rPr>
-              <a:t>© </a:t>
-            </a:r>
-            <a:r>
-              <a:rPr lang="en-US" sz="1400" dirty="0" smtClean="0">
-                <a:solidFill>
-                  <a:srgbClr val="FBFCFF"/>
-                </a:solidFill>
-              </a:rPr>
-              <a:t>2013 </a:t>
-            </a:r>
-            <a:r>
-              <a:rPr lang="en-US" sz="1400" dirty="0" smtClean="0">
-                <a:solidFill>
-                  <a:srgbClr val="FBFCFF"/>
-                </a:solidFill>
-              </a:rPr>
-              <a:t>Brightcove Inc.</a:t>
+              <a:t>© 2013 Brightcove Inc.</a:t>
             </a:r>
           </a:p>
         </p:txBody>
@@ -11311,11 +11219,7 @@
             </a:pPr>
             <a:r>
               <a:rPr lang="en-US" sz="3700" dirty="0" smtClean="0"/>
-              <a:t> </a:t>
-            </a:r>
-            <a:r>
-              <a:rPr lang="en-US" sz="3700" dirty="0" smtClean="0"/>
-              <a:t>player </a:t>
+              <a:t> player </a:t>
             </a:r>
             <a:r>
               <a:rPr lang="en-US" sz="3700" dirty="0"/>
@@ -11336,11 +11240,7 @@
             </a:pPr>
             <a:r>
               <a:rPr lang="en-US" sz="3700" dirty="0" smtClean="0"/>
-              <a:t> </a:t>
-            </a:r>
-            <a:r>
-              <a:rPr lang="en-US" sz="3700" dirty="0" smtClean="0"/>
-              <a:t>player.loadVideo</a:t>
+              <a:t> player.loadVideo</a:t>
             </a:r>
             <a:r>
               <a:rPr lang="en-US" sz="3700" dirty="0"/>
@@ -11353,11 +11253,7 @@
             </a:pPr>
             <a:r>
               <a:rPr lang="en-US" sz="3700" dirty="0" smtClean="0"/>
-              <a:t> </a:t>
-            </a:r>
-            <a:r>
-              <a:rPr lang="en-US" sz="3700" dirty="0" smtClean="0"/>
-              <a:t>player.start</a:t>
+              <a:t> player.start</a:t>
             </a:r>
             <a:r>
               <a:rPr lang="en-US" sz="3700" dirty="0"/>
@@ -11948,21 +11844,31 @@
                 <a:latin typeface="Source Code Pro"/>
                 <a:cs typeface="Source Code Pro"/>
               </a:rPr>
-              <a:t>  videoPlayer.getCurrentVideo</a:t>
-            </a:r>
+              <a:t>  videoPlayer.getCurrentVideo();</a:t>
+            </a:r>
+          </a:p>
+          <a:p>
+            <a:pPr marL="0" indent="0">
+              <a:buNone/>
+            </a:pPr>
             <a:r>
               <a:rPr lang="en-US" dirty="0" smtClean="0">
                 <a:latin typeface="Source Code Pro"/>
                 <a:cs typeface="Source Code Pro"/>
               </a:rPr>
-              <a:t>()</a:t>
-            </a:r>
+              <a:t>  document.getElementById</a:t>
+            </a:r>
+          </a:p>
+          <a:p>
+            <a:pPr marL="0" indent="0">
+              <a:buNone/>
+            </a:pPr>
             <a:r>
               <a:rPr lang="en-US" dirty="0" smtClean="0">
                 <a:latin typeface="Source Code Pro"/>
                 <a:cs typeface="Source Code Pro"/>
               </a:rPr>
-              <a:t>;</a:t>
+              <a:t>  ("videoTitle").innerHTML=</a:t>
             </a:r>
           </a:p>
           <a:p>
@@ -11970,77 +11876,18 @@
               <a:buNone/>
             </a:pPr>
             <a:r>
+              <a:rPr lang="en-US" dirty="0">
+                <a:latin typeface="Source Code Pro"/>
+                <a:cs typeface="Source Code Pro"/>
+              </a:rPr>
+              <a:t> </a:t>
+            </a:r>
+            <a:r>
               <a:rPr lang="en-US" dirty="0" smtClean="0">
                 <a:latin typeface="Source Code Pro"/>
                 <a:cs typeface="Source Code Pro"/>
               </a:rPr>
-              <a:t>  document.getElementById</a:t>
-            </a:r>
-          </a:p>
-          <a:p>
-            <a:pPr marL="0" indent="0">
-              <a:buNone/>
-            </a:pPr>
-            <a:r>
-              <a:rPr lang="en-US" dirty="0" smtClean="0">
-                <a:latin typeface="Source Code Pro"/>
-                <a:cs typeface="Source Code Pro"/>
-              </a:rPr>
-              <a:t>  (</a:t>
-            </a:r>
-            <a:r>
-              <a:rPr lang="en-US" dirty="0" smtClean="0">
-                <a:latin typeface="Source Code Pro"/>
-                <a:cs typeface="Source Code Pro"/>
-              </a:rPr>
-              <a:t>"videoTitle"</a:t>
-            </a:r>
-            <a:r>
-              <a:rPr lang="en-US" dirty="0" smtClean="0">
-                <a:latin typeface="Source Code Pro"/>
-                <a:cs typeface="Source Code Pro"/>
-              </a:rPr>
-              <a:t>).innerHTML</a:t>
-            </a:r>
-            <a:r>
-              <a:rPr lang="en-US" dirty="0" smtClean="0">
-                <a:latin typeface="Source Code Pro"/>
-                <a:cs typeface="Source Code Pro"/>
-              </a:rPr>
-              <a:t>=</a:t>
-            </a:r>
-          </a:p>
-          <a:p>
-            <a:pPr marL="0" indent="0">
-              <a:buNone/>
-            </a:pPr>
-            <a:r>
-              <a:rPr lang="en-US" dirty="0">
-                <a:latin typeface="Source Code Pro"/>
-                <a:cs typeface="Source Code Pro"/>
-              </a:rPr>
-              <a:t> </a:t>
-            </a:r>
-            <a:r>
-              <a:rPr lang="en-US" dirty="0" smtClean="0">
-                <a:latin typeface="Source Code Pro"/>
-                <a:cs typeface="Source Code Pro"/>
-              </a:rPr>
-              <a:t> </a:t>
-            </a:r>
-            <a:r>
-              <a:rPr lang="en-US" dirty="0" smtClean="0">
-                <a:latin typeface="Source Code Pro"/>
-                <a:cs typeface="Source Code Pro"/>
-              </a:rPr>
-              <a:t>video.displayName</a:t>
-            </a:r>
-            <a:r>
-              <a:rPr lang="en-US" dirty="0" smtClean="0">
-                <a:latin typeface="Source Code Pro"/>
-                <a:cs typeface="Source Code Pro"/>
-              </a:rPr>
-              <a:t>;</a:t>
+              <a:t> video.displayName;</a:t>
             </a:r>
             <a:endParaRPr lang="en-US" dirty="0">
               <a:latin typeface="Source Code Pro"/>
@@ -12276,33 +12123,19 @@
                 <a:latin typeface="Source Code Pro"/>
                 <a:cs typeface="Source Code Pro"/>
               </a:rPr>
-              <a:t> </a:t>
-            </a:r>
+              <a:t> = function(videoDTO) {</a:t>
+            </a:r>
+          </a:p>
+          <a:p>
+            <a:pPr marL="0" indent="0">
+              <a:buNone/>
+            </a:pPr>
             <a:r>
               <a:rPr lang="en-US" dirty="0" smtClean="0">
                 <a:latin typeface="Source Code Pro"/>
                 <a:cs typeface="Source Code Pro"/>
               </a:rPr>
-              <a:t>= function(videoDTO) {</a:t>
-            </a:r>
-          </a:p>
-          <a:p>
-            <a:pPr marL="0" indent="0">
-              <a:buNone/>
-            </a:pPr>
-            <a:r>
-              <a:rPr lang="en-US" dirty="0" smtClean="0">
-                <a:latin typeface="Source Code Pro"/>
-                <a:cs typeface="Source Code Pro"/>
-              </a:rPr>
-              <a:t> document.getElementById</a:t>
-            </a:r>
-            <a:r>
-              <a:rPr lang="en-US" dirty="0" smtClean="0">
-                <a:latin typeface="Source Code Pro"/>
-                <a:cs typeface="Source Code Pro"/>
-              </a:rPr>
-              <a:t>("displayName").</a:t>
+              <a:t> document.getElementById("displayName").</a:t>
             </a:r>
           </a:p>
           <a:p>
@@ -12915,21 +12748,8 @@
                   <a:schemeClr val="tx1"/>
                 </a:solidFill>
               </a:rPr>
-              <a:t>In </a:t>
-            </a:r>
-            <a:r>
-              <a:rPr lang="en-US" sz="3000" dirty="0" smtClean="0">
-                <a:solidFill>
-                  <a:schemeClr val="tx1"/>
-                </a:solidFill>
-              </a:rPr>
-              <a:t>JavaScript</a:t>
-            </a:r>
-            <a:endParaRPr lang="en-US" sz="3000" dirty="0" smtClean="0">
-              <a:solidFill>
-                <a:schemeClr val="tx1"/>
-              </a:solidFill>
-            </a:endParaRPr>
+              <a:t>In JavaScript</a:t>
+            </a:r>
           </a:p>
           <a:p>
             <a:pPr lvl="1" eaLnBrk="1" hangingPunct="1"/>
@@ -14289,7 +14109,6 @@
               <a:rPr lang="en-US" dirty="0" smtClean="0"/>
               <a:t>Demo 1: The Basics</a:t>
             </a:r>
-            <a:endParaRPr lang="en-US" dirty="0" smtClean="0"/>
           </a:p>
         </p:txBody>
       </p:sp>
@@ -15374,7 +15193,6 @@
               <a:rPr lang="en-US" dirty="0" smtClean="0"/>
               <a:t>Demo 2: Displaying Basic Video Information</a:t>
             </a:r>
-            <a:endParaRPr lang="en-US" dirty="0" smtClean="0"/>
           </a:p>
         </p:txBody>
       </p:sp>
@@ -16220,7 +16038,6 @@
               <a:rPr lang="en-US" dirty="0" smtClean="0"/>
               <a:t>Demo 3: Displaying Video Time Using the PROGESS Event</a:t>
             </a:r>
-            <a:endParaRPr lang="en-US" dirty="0" smtClean="0"/>
           </a:p>
         </p:txBody>
       </p:sp>
@@ -18362,7 +18179,6 @@
               <a:rPr lang="en-US" dirty="0" smtClean="0"/>
               <a:t>Demo 4: Displaying Metadata, Custom Fields and Duration</a:t>
             </a:r>
-            <a:endParaRPr lang="en-US" dirty="0" smtClean="0"/>
           </a:p>
         </p:txBody>
       </p:sp>
@@ -19063,7 +18879,6 @@
               <a:rPr lang="en-US" dirty="0" smtClean="0"/>
               <a:t>Demo 5: Displaying Rendition Information</a:t>
             </a:r>
-            <a:endParaRPr lang="en-US" dirty="0" smtClean="0"/>
           </a:p>
         </p:txBody>
       </p:sp>
@@ -19520,7 +19335,6 @@
               <a:rPr lang="en-US" dirty="0" smtClean="0"/>
               <a:t>A possible implementation</a:t>
             </a:r>
-            <a:endParaRPr lang="en-US" dirty="0" smtClean="0"/>
           </a:p>
         </p:txBody>
       </p:sp>
@@ -19591,7 +19405,6 @@
               <a:rPr lang="en-US" sz="3400" dirty="0" smtClean="0"/>
               <a:t> to play video</a:t>
             </a:r>
-            <a:endParaRPr lang="en-US" sz="3400" dirty="0" smtClean="0"/>
           </a:p>
         </p:txBody>
       </p:sp>
@@ -19933,7 +19746,6 @@
               <a:rPr lang="en-US" dirty="0" smtClean="0"/>
               <a:t>Demo 6: Play a Video on Selection</a:t>
             </a:r>
-            <a:endParaRPr lang="en-US" dirty="0" smtClean="0"/>
           </a:p>
         </p:txBody>
       </p:sp>
@@ -20396,15 +20208,7 @@
           <a:p>
             <a:r>
               <a:rPr lang="en-US" sz="3000" dirty="0" smtClean="0"/>
-              <a:t>In this </a:t>
-            </a:r>
-            <a:r>
-              <a:rPr lang="en-US" sz="3000" dirty="0" smtClean="0"/>
-              <a:t>course </a:t>
-            </a:r>
-            <a:r>
-              <a:rPr lang="en-US" sz="3000" dirty="0" smtClean="0"/>
-              <a:t>we will be using the standard Chromeless for all examples</a:t>
+              <a:t>In this course we will be using the standard Chromeless for all examples</a:t>
             </a:r>
             <a:endParaRPr lang="en-US" sz="3000" dirty="0"/>
           </a:p>
@@ -20549,26 +20353,13 @@
             <a:pPr lvl="1"/>
             <a:r>
               <a:rPr lang="en-US" sz="3000" dirty="0" smtClean="0"/>
-              <a:t>What if code is copied directly and not modified thus giving user poorly architec</a:t>
-            </a:r>
+              <a:t>What if code is copied directly and not modified thus giving user poorly architected code?</a:t>
+            </a:r>
+          </a:p>
+          <a:p>
             <a:r>
               <a:rPr lang="en-US" sz="3000" dirty="0" smtClean="0"/>
-              <a:t>ted code?</a:t>
-            </a:r>
-            <a:endParaRPr lang="en-US" sz="3000" dirty="0" smtClean="0"/>
-          </a:p>
-          <a:p>
-            <a:r>
-              <a:rPr lang="en-US" sz="3000" dirty="0" smtClean="0"/>
-              <a:t>Good pattern to use is a</a:t>
-            </a:r>
-            <a:r>
-              <a:rPr lang="en-US" sz="3000" dirty="0" smtClean="0"/>
-              <a:t> </a:t>
-            </a:r>
-            <a:r>
-              <a:rPr lang="en-US" sz="3000" dirty="0" smtClean="0"/>
-              <a:t>basic version of the </a:t>
+              <a:t>Good pattern to use is a basic version of the </a:t>
             </a:r>
             <a:r>
               <a:rPr lang="en-US" sz="3000" dirty="0" smtClean="0">

</xml_diff>